<commit_message>
Update features and suggestions
</commit_message>
<xml_diff>
--- a/presentation.pptx
+++ b/presentation.pptx
@@ -361,7 +361,7 @@
           <a:p>
             <a:fld id="{9184DA70-C731-4C70-880D-CCD4705E623C}" type="datetime1">
               <a:rPr lang="en-US" smtClean="0"/>
-              <a:t>14-Aug-19</a:t>
+              <a:t>8/14/2019</a:t>
             </a:fld>
             <a:endParaRPr lang="en-US" dirty="0"/>
           </a:p>
@@ -549,7 +549,7 @@
           <a:p>
             <a:fld id="{B612A279-0833-481D-8C56-F67FD0AC6C50}" type="datetime1">
               <a:rPr lang="en-US" smtClean="0"/>
-              <a:t>14-Aug-19</a:t>
+              <a:t>8/14/2019</a:t>
             </a:fld>
             <a:endParaRPr lang="en-US" dirty="0"/>
           </a:p>
@@ -791,7 +791,7 @@
           <a:p>
             <a:fld id="{6587DA83-5663-4C9C-B9AA-0B40A3DAFF81}" type="datetime1">
               <a:rPr lang="en-US" smtClean="0"/>
-              <a:t>14-Aug-19</a:t>
+              <a:t>8/14/2019</a:t>
             </a:fld>
             <a:endParaRPr lang="en-US" dirty="0"/>
           </a:p>
@@ -979,7 +979,7 @@
           <a:p>
             <a:fld id="{4BE1D723-8F53-4F53-90B0-1982A396982E}" type="datetime1">
               <a:rPr lang="en-US" smtClean="0"/>
-              <a:t>14-Aug-19</a:t>
+              <a:t>8/14/2019</a:t>
             </a:fld>
             <a:endParaRPr lang="en-US" dirty="0"/>
           </a:p>
@@ -1352,7 +1352,7 @@
           <a:p>
             <a:fld id="{97669AF7-7BEB-44E4-9852-375E34362B5B}" type="datetime1">
               <a:rPr lang="en-US" smtClean="0"/>
-              <a:t>14-Aug-19</a:t>
+              <a:t>8/14/2019</a:t>
             </a:fld>
             <a:endParaRPr lang="en-US" dirty="0"/>
           </a:p>
@@ -1607,7 +1607,7 @@
           <a:p>
             <a:fld id="{BAAAC38D-0552-4C82-B593-E6124DFADBE2}" type="datetime1">
               <a:rPr lang="en-US" smtClean="0"/>
-              <a:t>14-Aug-19</a:t>
+              <a:t>8/14/2019</a:t>
             </a:fld>
             <a:endParaRPr lang="en-US" dirty="0"/>
           </a:p>
@@ -2004,7 +2004,7 @@
           <a:p>
             <a:fld id="{D9DF0F1C-5577-4ACB-BB62-DF8F3C494C7E}" type="datetime1">
               <a:rPr lang="en-US" smtClean="0"/>
-              <a:t>14-Aug-19</a:t>
+              <a:t>8/14/2019</a:t>
             </a:fld>
             <a:endParaRPr lang="en-US" dirty="0"/>
           </a:p>
@@ -2140,7 +2140,7 @@
           <a:p>
             <a:fld id="{1775B394-D9F9-4F0C-B15D-605F45CB9E9F}" type="datetime1">
               <a:rPr lang="en-US" smtClean="0"/>
-              <a:t>14-Aug-19</a:t>
+              <a:t>8/14/2019</a:t>
             </a:fld>
             <a:endParaRPr lang="en-US" dirty="0"/>
           </a:p>
@@ -2297,7 +2297,7 @@
           <a:p>
             <a:fld id="{39667345-2558-425A-8533-9BFDBCE15005}" type="datetime1">
               <a:rPr lang="en-US" smtClean="0"/>
-              <a:t>14-Aug-19</a:t>
+              <a:t>8/14/2019</a:t>
             </a:fld>
             <a:endParaRPr lang="en-US" dirty="0"/>
           </a:p>
@@ -2626,7 +2626,7 @@
           <a:p>
             <a:fld id="{92BEA474-078D-4E9B-9B14-09A87B19DC46}" type="datetime1">
               <a:rPr lang="en-US" smtClean="0"/>
-              <a:t>14-Aug-19</a:t>
+              <a:t>8/14/2019</a:t>
             </a:fld>
             <a:endParaRPr lang="en-US" dirty="0"/>
           </a:p>
@@ -2976,7 +2976,7 @@
           <a:p>
             <a:fld id="{4907D986-8816-4272-A432-0437A28A9828}" type="datetime1">
               <a:rPr lang="en-US" smtClean="0"/>
-              <a:t>14-Aug-19</a:t>
+              <a:t>8/14/2019</a:t>
             </a:fld>
             <a:endParaRPr lang="en-US" dirty="0"/>
           </a:p>
@@ -3237,7 +3237,7 @@
           <a:p>
             <a:fld id="{62D6E202-B606-4609-B914-27C9371A1F6D}" type="datetime1">
               <a:rPr lang="en-US" smtClean="0"/>
-              <a:t>14-Aug-19</a:t>
+              <a:t>8/14/2019</a:t>
             </a:fld>
             <a:endParaRPr lang="en-US" dirty="0"/>
           </a:p>
@@ -5191,6 +5191,23 @@
               <a:t>Display users’ purchased bookings</a:t>
             </a:r>
           </a:p>
+          <a:p>
+            <a:r>
+              <a:rPr lang="en-US" sz="2400" dirty="0"/>
+              <a:t>Responsive Design</a:t>
+            </a:r>
+          </a:p>
+          <a:p>
+            <a:r>
+              <a:rPr lang="en-US" sz="2400" dirty="0"/>
+              <a:t>Different privileges depending </a:t>
+            </a:r>
+            <a:r>
+              <a:rPr lang="en-US" sz="2400"/>
+              <a:t>on user role</a:t>
+            </a:r>
+            <a:endParaRPr lang="en-US" sz="2400" dirty="0"/>
+          </a:p>
         </p:txBody>
       </p:sp>
     </p:spTree>
@@ -5421,15 +5438,13 @@
           <a:p>
             <a:r>
               <a:rPr lang="en-US" sz="2400" dirty="0"/>
-              <a:t>User can customize his</a:t>
-            </a:r>
-            <a:r>
-              <a:rPr lang="en-US" sz="2400"/>
-              <a:t>/her own </a:t>
-            </a:r>
+              <a:t>User can customize his/her own packages</a:t>
+            </a:r>
+          </a:p>
+          <a:p>
             <a:r>
               <a:rPr lang="en-US" sz="2400" dirty="0"/>
-              <a:t>packages</a:t>
+              <a:t>Shopping Cart</a:t>
             </a:r>
           </a:p>
         </p:txBody>

</xml_diff>